<commit_message>
deconvolution t errors, predict deconv expression function
</commit_message>
<xml_diff>
--- a/output/slides/slides_6-11.pptx
+++ b/output/slides/slides_6-11.pptx
@@ -5423,7 +5423,23 @@
             </a:pPr>
             <a:r>
               <a:rPr lang="en-US" dirty="0"/>
-              <a:t>Melanoma clustering simulation (Fig 3)</a:t>
+              <a:t>Melanoma </a:t>
+            </a:r>
+            <a:r>
+              <a:rPr lang="en-US" dirty="0" err="1"/>
+              <a:t>deconv</a:t>
+            </a:r>
+            <a:r>
+              <a:rPr lang="en-US" dirty="0"/>
+              <a:t> w/ 4 </a:t>
+            </a:r>
+            <a:r>
+              <a:rPr lang="en-US" dirty="0" err="1"/>
+              <a:t>subspots</a:t>
+            </a:r>
+            <a:r>
+              <a:rPr lang="en-US" dirty="0"/>
+              <a:t> instead of 9</a:t>
             </a:r>
           </a:p>
           <a:p>
@@ -5433,15 +5449,7 @@
             </a:pPr>
             <a:r>
               <a:rPr lang="en-US" dirty="0"/>
-              <a:t>Add </a:t>
-            </a:r>
-            <a:r>
-              <a:rPr lang="en-US" dirty="0" err="1"/>
-              <a:t>stLearn</a:t>
-            </a:r>
-            <a:r>
-              <a:rPr lang="en-US" dirty="0"/>
-              <a:t>/Giotto clustering ARI vs. ground truth (Fig 2)</a:t>
+              <a:t>Melanoma real data and simulation with q=4 clusters</a:t>
             </a:r>
           </a:p>
           <a:p>
@@ -5451,8 +5459,51 @@
             </a:pPr>
             <a:r>
               <a:rPr lang="en-US" dirty="0"/>
+              <a:t>Melanoma clustering simulation (Fig 3)</a:t>
+            </a:r>
+          </a:p>
+          <a:p>
+            <a:pPr marL="514350" indent="-514350">
+              <a:buFont typeface="+mj-lt"/>
+              <a:buAutoNum type="arabicPeriod"/>
+            </a:pPr>
+            <a:r>
+              <a:rPr lang="en-US" dirty="0"/>
+              <a:t>Add </a:t>
+            </a:r>
+            <a:r>
+              <a:rPr lang="en-US" dirty="0" err="1"/>
+              <a:t>stLearn</a:t>
+            </a:r>
+            <a:r>
+              <a:rPr lang="en-US" dirty="0"/>
+              <a:t>/Giotto clustering ARI vs. ground truth (Fig 2)</a:t>
+            </a:r>
+          </a:p>
+          <a:p>
+            <a:pPr marL="514350" indent="-514350">
+              <a:buFont typeface="+mj-lt"/>
+              <a:buAutoNum type="arabicPeriod"/>
+            </a:pPr>
+            <a:r>
+              <a:rPr lang="en-US" dirty="0"/>
               <a:t>Breast cancer clustering simulation (Fig 3)</a:t>
             </a:r>
+          </a:p>
+          <a:p>
+            <a:pPr marL="971550" lvl="1" indent="-514350">
+              <a:buFont typeface="+mj-lt"/>
+              <a:buAutoNum type="arabicPeriod"/>
+            </a:pPr>
+            <a:r>
+              <a:rPr lang="en-US" dirty="0"/>
+              <a:t>2 samples, </a:t>
+            </a:r>
+            <a:r>
+              <a:rPr lang="en-US"/>
+              <a:t>check stability</a:t>
+            </a:r>
+            <a:endParaRPr lang="en-US" dirty="0"/>
           </a:p>
           <a:p>
             <a:pPr marL="514350" indent="-514350">

</xml_diff>